<commit_message>
updating read me file
</commit_message>
<xml_diff>
--- a/Files/Project_II.pptx
+++ b/Files/Project_II.pptx
@@ -3608,7 +3608,7 @@
           <a:p>
             <a:fld id="{EA0C0817-A112-4847-8014-A94B7D2A4EA3}" type="datetime1">
               <a:rPr lang="en-US" smtClean="0"/>
-              <a:t>7/14/2020</a:t>
+              <a:t>7/15/2020</a:t>
             </a:fld>
             <a:endParaRPr lang="en-US" dirty="0"/>
           </a:p>
@@ -3810,7 +3810,7 @@
           <a:p>
             <a:fld id="{7332B432-ACDA-4023-A761-2BAB76577B62}" type="datetime1">
               <a:rPr lang="en-US" smtClean="0"/>
-              <a:t>7/14/2020</a:t>
+              <a:t>7/15/2020</a:t>
             </a:fld>
             <a:endParaRPr lang="en-US" dirty="0"/>
           </a:p>
@@ -4409,7 +4409,7 @@
           <a:p>
             <a:fld id="{D9C646AA-F36E-4540-911D-FFFC0A0EF24A}" type="datetime1">
               <a:rPr lang="en-US" smtClean="0"/>
-              <a:t>7/14/2020</a:t>
+              <a:t>7/15/2020</a:t>
             </a:fld>
             <a:endParaRPr lang="en-US" dirty="0"/>
           </a:p>
@@ -4729,7 +4729,7 @@
           <a:p>
             <a:fld id="{69186D26-FA5F-4637-B602-B7C2DC34CFD4}" type="datetime1">
               <a:rPr lang="en-US" smtClean="0"/>
-              <a:t>7/14/2020</a:t>
+              <a:t>7/15/2020</a:t>
             </a:fld>
             <a:endParaRPr lang="en-US" dirty="0"/>
           </a:p>
@@ -5166,7 +5166,7 @@
           <a:p>
             <a:fld id="{8A7F15D8-96D1-4781-BC50-CA8A088B2FE4}" type="datetime1">
               <a:rPr lang="en-US" smtClean="0"/>
-              <a:t>7/14/2020</a:t>
+              <a:t>7/15/2020</a:t>
             </a:fld>
             <a:endParaRPr lang="en-US" dirty="0"/>
           </a:p>
@@ -5284,7 +5284,7 @@
           <a:p>
             <a:fld id="{F9A96C99-B8F8-4528-BD05-0E16E943DC09}" type="datetime1">
               <a:rPr lang="en-US" smtClean="0"/>
-              <a:t>7/14/2020</a:t>
+              <a:t>7/15/2020</a:t>
             </a:fld>
             <a:endParaRPr lang="en-US" dirty="0"/>
           </a:p>
@@ -5379,7 +5379,7 @@
           <a:p>
             <a:fld id="{03636942-C211-4B28-8DBD-C953E00AF71B}" type="datetime1">
               <a:rPr lang="en-US" smtClean="0"/>
-              <a:t>7/14/2020</a:t>
+              <a:t>7/15/2020</a:t>
             </a:fld>
             <a:endParaRPr lang="en-US" dirty="0"/>
           </a:p>
@@ -5796,7 +5796,7 @@
           <a:p>
             <a:fld id="{7E8D12A6-918A-48BD-8CB9-CA713993B0EA}" type="datetime1">
               <a:rPr lang="en-US" smtClean="0"/>
-              <a:t>7/14/2020</a:t>
+              <a:t>7/15/2020</a:t>
             </a:fld>
             <a:endParaRPr lang="en-US" dirty="0"/>
           </a:p>
@@ -6058,7 +6058,7 @@
             <a:fld id="{E778CE86-875F-4587-BCF6-FA054AFC0D53}" type="datetime1">
               <a:rPr lang="en-US" smtClean="0"/>
               <a:pPr/>
-              <a:t>7/14/2020</a:t>
+              <a:t>7/15/2020</a:t>
             </a:fld>
             <a:endParaRPr lang="en-US" dirty="0"/>
           </a:p>
@@ -6574,7 +6574,7 @@
           <a:p>
             <a:fld id="{F6FA2B21-3FCD-4721-B95C-427943F61125}" type="datetime1">
               <a:rPr lang="en-US" smtClean="0"/>
-              <a:t>7/14/2020</a:t>
+              <a:t>7/15/2020</a:t>
             </a:fld>
             <a:endParaRPr lang="en-US" dirty="0"/>
           </a:p>
@@ -8002,6 +8002,36 @@
           </a:p>
         </p:txBody>
       </p:sp>
+      <p:pic>
+        <p:nvPicPr>
+          <p:cNvPr id="5" name="Picture 4">
+            <a:extLst>
+              <a:ext uri="{FF2B5EF4-FFF2-40B4-BE49-F238E27FC236}">
+                <a16:creationId xmlns:a16="http://schemas.microsoft.com/office/drawing/2014/main" id="{E761A7D4-7A3C-4367-B429-04815AF78E0E}"/>
+              </a:ext>
+            </a:extLst>
+          </p:cNvPr>
+          <p:cNvPicPr>
+            <a:picLocks noChangeAspect="1"/>
+          </p:cNvPicPr>
+          <p:nvPr/>
+        </p:nvPicPr>
+        <p:blipFill>
+          <a:blip r:embed="rId2"/>
+          <a:stretch>
+            <a:fillRect/>
+          </a:stretch>
+        </p:blipFill>
+        <p:spPr>
+          <a:xfrm>
+            <a:off x="2372268" y="4456966"/>
+            <a:ext cx="3371429" cy="1276190"/>
+          </a:xfrm>
+          <a:prstGeom prst="rect">
+            <a:avLst/>
+          </a:prstGeom>
+        </p:spPr>
+      </p:pic>
     </p:spTree>
     <p:extLst>
       <p:ext uri="{BB962C8B-B14F-4D97-AF65-F5344CB8AC3E}">
@@ -8262,6 +8292,36 @@
           </a:p>
         </p:txBody>
       </p:sp>
+      <p:pic>
+        <p:nvPicPr>
+          <p:cNvPr id="5" name="Picture 4">
+            <a:extLst>
+              <a:ext uri="{FF2B5EF4-FFF2-40B4-BE49-F238E27FC236}">
+                <a16:creationId xmlns:a16="http://schemas.microsoft.com/office/drawing/2014/main" id="{7109742E-4168-4660-92E1-C2BC8A29296A}"/>
+              </a:ext>
+            </a:extLst>
+          </p:cNvPr>
+          <p:cNvPicPr>
+            <a:picLocks noChangeAspect="1"/>
+          </p:cNvPicPr>
+          <p:nvPr/>
+        </p:nvPicPr>
+        <p:blipFill>
+          <a:blip r:embed="rId2"/>
+          <a:stretch>
+            <a:fillRect/>
+          </a:stretch>
+        </p:blipFill>
+        <p:spPr>
+          <a:xfrm>
+            <a:off x="615122" y="4357563"/>
+            <a:ext cx="6885714" cy="638095"/>
+          </a:xfrm>
+          <a:prstGeom prst="rect">
+            <a:avLst/>
+          </a:prstGeom>
+        </p:spPr>
+      </p:pic>
     </p:spTree>
     <p:extLst>
       <p:ext uri="{BB962C8B-B14F-4D97-AF65-F5344CB8AC3E}">
@@ -8540,6 +8600,36 @@
           </a:p>
         </p:txBody>
       </p:sp>
+      <p:pic>
+        <p:nvPicPr>
+          <p:cNvPr id="3" name="Picture 2">
+            <a:extLst>
+              <a:ext uri="{FF2B5EF4-FFF2-40B4-BE49-F238E27FC236}">
+                <a16:creationId xmlns:a16="http://schemas.microsoft.com/office/drawing/2014/main" id="{6BD18790-E6BD-4910-AC25-86422EA4BB00}"/>
+              </a:ext>
+            </a:extLst>
+          </p:cNvPr>
+          <p:cNvPicPr>
+            <a:picLocks noChangeAspect="1"/>
+          </p:cNvPicPr>
+          <p:nvPr/>
+        </p:nvPicPr>
+        <p:blipFill>
+          <a:blip r:embed="rId2"/>
+          <a:stretch>
+            <a:fillRect/>
+          </a:stretch>
+        </p:blipFill>
+        <p:spPr>
+          <a:xfrm>
+            <a:off x="2988532" y="4092314"/>
+            <a:ext cx="1952898" cy="1819529"/>
+          </a:xfrm>
+          <a:prstGeom prst="rect">
+            <a:avLst/>
+          </a:prstGeom>
+        </p:spPr>
+      </p:pic>
     </p:spTree>
     <p:extLst>
       <p:ext uri="{BB962C8B-B14F-4D97-AF65-F5344CB8AC3E}">
@@ -10928,21 +11018,21 @@
 </file>
 
 <file path=customXml/item2.xml><?xml version="1.0" encoding="utf-8"?>
+<?mso-contentType ?>
+<FormTemplates xmlns="http://schemas.microsoft.com/sharepoint/v3/contenttype/forms">
+  <Display>DocumentLibraryForm</Display>
+  <Edit>DocumentLibraryForm</Edit>
+  <New>DocumentLibraryForm</New>
+</FormTemplates>
+</file>
+
+<file path=customXml/item3.xml><?xml version="1.0" encoding="utf-8"?>
 <p:properties xmlns:p="http://schemas.microsoft.com/office/2006/metadata/properties" xmlns:xsi="http://www.w3.org/2001/XMLSchema-instance" xmlns:pc="http://schemas.microsoft.com/office/infopath/2007/PartnerControls">
   <documentManagement>
     <Status xmlns="71af3243-3dd4-4a8d-8c0d-dd76da1f02a5">Not started</Status>
     <MediaServiceKeyPoints xmlns="71af3243-3dd4-4a8d-8c0d-dd76da1f02a5" xsi:nil="true"/>
   </documentManagement>
 </p:properties>
-</file>
-
-<file path=customXml/item3.xml><?xml version="1.0" encoding="utf-8"?>
-<?mso-contentType ?>
-<FormTemplates xmlns="http://schemas.microsoft.com/sharepoint/v3/contenttype/forms">
-  <Display>DocumentLibraryForm</Display>
-  <Edit>DocumentLibraryForm</Edit>
-  <New>DocumentLibraryForm</New>
-</FormTemplates>
 </file>
 
 <file path=customXml/itemProps1.xml><?xml version="1.0" encoding="utf-8"?>
@@ -10965,6 +11055,14 @@
 </file>
 
 <file path=customXml/itemProps2.xml><?xml version="1.0" encoding="utf-8"?>
+<ds:datastoreItem xmlns:ds="http://schemas.openxmlformats.org/officeDocument/2006/customXml" ds:itemID="{CDB58277-F8DF-46FF-84EC-EF41B835E69F}">
+  <ds:schemaRefs>
+    <ds:schemaRef ds:uri="http://schemas.microsoft.com/sharepoint/v3/contenttype/forms"/>
+  </ds:schemaRefs>
+</ds:datastoreItem>
+</file>
+
+<file path=customXml/itemProps3.xml><?xml version="1.0" encoding="utf-8"?>
 <ds:datastoreItem xmlns:ds="http://schemas.openxmlformats.org/officeDocument/2006/customXml" ds:itemID="{137651BA-F45C-4845-9AB3-E0A65B39F5E1}">
   <ds:schemaRefs>
     <ds:schemaRef ds:uri="http://schemas.microsoft.com/office/2006/metadata/properties"/>
@@ -10972,12 +11070,4 @@
     <ds:schemaRef ds:uri="71af3243-3dd4-4a8d-8c0d-dd76da1f02a5"/>
   </ds:schemaRefs>
 </ds:datastoreItem>
-</file>
-
-<file path=customXml/itemProps3.xml><?xml version="1.0" encoding="utf-8"?>
-<ds:datastoreItem xmlns:ds="http://schemas.openxmlformats.org/officeDocument/2006/customXml" ds:itemID="{CDB58277-F8DF-46FF-84EC-EF41B835E69F}">
-  <ds:schemaRefs>
-    <ds:schemaRef ds:uri="http://schemas.microsoft.com/sharepoint/v3/contenttype/forms"/>
-  </ds:schemaRefs>
-</ds:datastoreItem>
 </file>
</xml_diff>